<commit_message>
spent more time trying to get monte_carlo_two_d_shot.py working - still having trouble running the monte carlo simulation with the nested for loop
</commit_message>
<xml_diff>
--- a/Weekly Presentations/Week 3.pptx
+++ b/Weekly Presentations/Week 3.pptx
@@ -8,10 +8,9 @@
     <p:sldId id="256" r:id="rId2"/>
     <p:sldId id="257" r:id="rId3"/>
     <p:sldId id="258" r:id="rId4"/>
-    <p:sldId id="259" r:id="rId5"/>
-    <p:sldId id="260" r:id="rId6"/>
-    <p:sldId id="261" r:id="rId7"/>
-    <p:sldId id="262" r:id="rId8"/>
+    <p:sldId id="260" r:id="rId5"/>
+    <p:sldId id="261" r:id="rId6"/>
+    <p:sldId id="262" r:id="rId7"/>
   </p:sldIdLst>
   <p:sldSz cx="12192000" cy="6858000"/>
   <p:notesSz cx="6858000" cy="9144000"/>
@@ -267,7 +266,7 @@
           <a:p>
             <a:fld id="{CAED13FC-1806-F74C-BFA2-1D9A4F5C03AA}" type="datetimeFigureOut">
               <a:rPr lang="en-US" smtClean="0"/>
-              <a:t>9/6/20</a:t>
+              <a:t>9/10/20</a:t>
             </a:fld>
             <a:endParaRPr lang="en-US"/>
           </a:p>
@@ -467,7 +466,7 @@
           <a:p>
             <a:fld id="{CAED13FC-1806-F74C-BFA2-1D9A4F5C03AA}" type="datetimeFigureOut">
               <a:rPr lang="en-US" smtClean="0"/>
-              <a:t>9/6/20</a:t>
+              <a:t>9/10/20</a:t>
             </a:fld>
             <a:endParaRPr lang="en-US"/>
           </a:p>
@@ -677,7 +676,7 @@
           <a:p>
             <a:fld id="{CAED13FC-1806-F74C-BFA2-1D9A4F5C03AA}" type="datetimeFigureOut">
               <a:rPr lang="en-US" smtClean="0"/>
-              <a:t>9/6/20</a:t>
+              <a:t>9/10/20</a:t>
             </a:fld>
             <a:endParaRPr lang="en-US"/>
           </a:p>
@@ -877,7 +876,7 @@
           <a:p>
             <a:fld id="{CAED13FC-1806-F74C-BFA2-1D9A4F5C03AA}" type="datetimeFigureOut">
               <a:rPr lang="en-US" smtClean="0"/>
-              <a:t>9/6/20</a:t>
+              <a:t>9/10/20</a:t>
             </a:fld>
             <a:endParaRPr lang="en-US"/>
           </a:p>
@@ -1153,7 +1152,7 @@
           <a:p>
             <a:fld id="{CAED13FC-1806-F74C-BFA2-1D9A4F5C03AA}" type="datetimeFigureOut">
               <a:rPr lang="en-US" smtClean="0"/>
-              <a:t>9/6/20</a:t>
+              <a:t>9/10/20</a:t>
             </a:fld>
             <a:endParaRPr lang="en-US"/>
           </a:p>
@@ -1421,7 +1420,7 @@
           <a:p>
             <a:fld id="{CAED13FC-1806-F74C-BFA2-1D9A4F5C03AA}" type="datetimeFigureOut">
               <a:rPr lang="en-US" smtClean="0"/>
-              <a:t>9/6/20</a:t>
+              <a:t>9/10/20</a:t>
             </a:fld>
             <a:endParaRPr lang="en-US"/>
           </a:p>
@@ -1836,7 +1835,7 @@
           <a:p>
             <a:fld id="{CAED13FC-1806-F74C-BFA2-1D9A4F5C03AA}" type="datetimeFigureOut">
               <a:rPr lang="en-US" smtClean="0"/>
-              <a:t>9/6/20</a:t>
+              <a:t>9/10/20</a:t>
             </a:fld>
             <a:endParaRPr lang="en-US"/>
           </a:p>
@@ -1978,7 +1977,7 @@
           <a:p>
             <a:fld id="{CAED13FC-1806-F74C-BFA2-1D9A4F5C03AA}" type="datetimeFigureOut">
               <a:rPr lang="en-US" smtClean="0"/>
-              <a:t>9/6/20</a:t>
+              <a:t>9/10/20</a:t>
             </a:fld>
             <a:endParaRPr lang="en-US"/>
           </a:p>
@@ -2091,7 +2090,7 @@
           <a:p>
             <a:fld id="{CAED13FC-1806-F74C-BFA2-1D9A4F5C03AA}" type="datetimeFigureOut">
               <a:rPr lang="en-US" smtClean="0"/>
-              <a:t>9/6/20</a:t>
+              <a:t>9/10/20</a:t>
             </a:fld>
             <a:endParaRPr lang="en-US"/>
           </a:p>
@@ -2404,7 +2403,7 @@
           <a:p>
             <a:fld id="{CAED13FC-1806-F74C-BFA2-1D9A4F5C03AA}" type="datetimeFigureOut">
               <a:rPr lang="en-US" smtClean="0"/>
-              <a:t>9/6/20</a:t>
+              <a:t>9/10/20</a:t>
             </a:fld>
             <a:endParaRPr lang="en-US"/>
           </a:p>
@@ -2693,7 +2692,7 @@
           <a:p>
             <a:fld id="{CAED13FC-1806-F74C-BFA2-1D9A4F5C03AA}" type="datetimeFigureOut">
               <a:rPr lang="en-US" smtClean="0"/>
-              <a:t>9/6/20</a:t>
+              <a:t>9/10/20</a:t>
             </a:fld>
             <a:endParaRPr lang="en-US"/>
           </a:p>
@@ -2936,7 +2935,7 @@
           <a:p>
             <a:fld id="{CAED13FC-1806-F74C-BFA2-1D9A4F5C03AA}" type="datetimeFigureOut">
               <a:rPr lang="en-US" smtClean="0"/>
-              <a:t>9/6/20</a:t>
+              <a:t>9/10/20</a:t>
             </a:fld>
             <a:endParaRPr lang="en-US"/>
           </a:p>
@@ -3488,7 +3487,16 @@
           <a:bodyPr/>
           <a:lstStyle/>
           <a:p>
-            <a:endParaRPr lang="en-US"/>
+            <a:r>
+              <a:rPr lang="en-US" dirty="0"/>
+              <a:t>Tried to start the Monte Carlo simulation with the side view of the 2d shot</a:t>
+            </a:r>
+          </a:p>
+          <a:p>
+            <a:r>
+              <a:rPr lang="en-US" dirty="0"/>
+              <a:t>Tried to plot the different ideal backboard angles for a series of random shots</a:t>
+            </a:r>
           </a:p>
         </p:txBody>
       </p:sp>
@@ -3550,28 +3558,71 @@
           </a:p>
         </p:txBody>
       </p:sp>
-      <p:sp>
-        <p:nvSpPr>
-          <p:cNvPr id="3" name="Content Placeholder 2">
-            <a:extLst>
-              <a:ext uri="{FF2B5EF4-FFF2-40B4-BE49-F238E27FC236}">
-                <a16:creationId xmlns:a16="http://schemas.microsoft.com/office/drawing/2014/main" id="{E7E30C38-918B-0041-9C9F-E9B553C36992}"/>
-              </a:ext>
-            </a:extLst>
-          </p:cNvPr>
-          <p:cNvSpPr>
-            <a:spLocks noGrp="1"/>
-          </p:cNvSpPr>
+      <p:pic>
+        <p:nvPicPr>
+          <p:cNvPr id="5" name="Content Placeholder 4" descr="A screenshot of a cell phone&#10;&#10;Description automatically generated">
+            <a:extLst>
+              <a:ext uri="{FF2B5EF4-FFF2-40B4-BE49-F238E27FC236}">
+                <a16:creationId xmlns:a16="http://schemas.microsoft.com/office/drawing/2014/main" id="{E43AE279-B156-4A48-AC12-062AD8BF0E07}"/>
+              </a:ext>
+            </a:extLst>
+          </p:cNvPr>
+          <p:cNvPicPr>
+            <a:picLocks noGrp="1" noChangeAspect="1"/>
+          </p:cNvPicPr>
           <p:nvPr>
             <p:ph idx="1"/>
           </p:nvPr>
-        </p:nvSpPr>
-        <p:spPr/>
-        <p:txBody>
-          <a:bodyPr/>
-          <a:lstStyle/>
-          <a:p>
-            <a:endParaRPr lang="en-US"/>
+        </p:nvPicPr>
+        <p:blipFill>
+          <a:blip r:embed="rId2"/>
+          <a:stretch>
+            <a:fillRect/>
+          </a:stretch>
+        </p:blipFill>
+        <p:spPr>
+          <a:xfrm>
+            <a:off x="838200" y="1690688"/>
+            <a:ext cx="5745744" cy="4351338"/>
+          </a:xfrm>
+        </p:spPr>
+      </p:pic>
+      <p:sp>
+        <p:nvSpPr>
+          <p:cNvPr id="7" name="TextBox 6">
+            <a:extLst>
+              <a:ext uri="{FF2B5EF4-FFF2-40B4-BE49-F238E27FC236}">
+                <a16:creationId xmlns:a16="http://schemas.microsoft.com/office/drawing/2014/main" id="{ADE7AC56-C247-2D4D-9FA7-458AD2E3A887}"/>
+              </a:ext>
+            </a:extLst>
+          </p:cNvPr>
+          <p:cNvSpPr txBox="1"/>
+          <p:nvPr/>
+        </p:nvSpPr>
+        <p:spPr>
+          <a:xfrm>
+            <a:off x="6956385" y="1794076"/>
+            <a:ext cx="4803493" cy="923330"/>
+          </a:xfrm>
+          <a:prstGeom prst="rect">
+            <a:avLst/>
+          </a:prstGeom>
+          <a:noFill/>
+        </p:spPr>
+        <p:txBody>
+          <a:bodyPr wrap="square" rtlCol="0">
+            <a:spAutoFit/>
+          </a:bodyPr>
+          <a:lstStyle/>
+          <a:p>
+            <a:pPr marL="285750" indent="-285750">
+              <a:buFont typeface="Arial" panose="020B0604020202020204" pitchFamily="34" charset="0"/>
+              <a:buChar char="•"/>
+            </a:pPr>
+            <a:r>
+              <a:rPr lang="en-US" dirty="0"/>
+              <a:t>Got a plot of different backboard angles – don’t entirely know if this is a correct graph, but it’s something!</a:t>
+            </a:r>
           </a:p>
         </p:txBody>
       </p:sp>
@@ -3610,7 +3661,7 @@
           <p:cNvPr id="2" name="Title 1">
             <a:extLst>
               <a:ext uri="{FF2B5EF4-FFF2-40B4-BE49-F238E27FC236}">
-                <a16:creationId xmlns:a16="http://schemas.microsoft.com/office/drawing/2014/main" id="{D5103FCA-3BDD-9F48-8E13-C47CCE0FE60B}"/>
+                <a16:creationId xmlns:a16="http://schemas.microsoft.com/office/drawing/2014/main" id="{E3E92A72-8304-B145-8885-9C3676792BAA}"/>
               </a:ext>
             </a:extLst>
           </p:cNvPr>
@@ -3628,7 +3679,7 @@
           <a:p>
             <a:r>
               <a:rPr lang="en-US" dirty="0"/>
-              <a:t>What Didn’t Work</a:t>
+              <a:t>Where am I Stuck</a:t>
             </a:r>
           </a:p>
         </p:txBody>
@@ -3638,7 +3689,7 @@
           <p:cNvPr id="3" name="Content Placeholder 2">
             <a:extLst>
               <a:ext uri="{FF2B5EF4-FFF2-40B4-BE49-F238E27FC236}">
-                <a16:creationId xmlns:a16="http://schemas.microsoft.com/office/drawing/2014/main" id="{E6FB2DED-56C1-4346-AC60-5F642EC6F091}"/>
+                <a16:creationId xmlns:a16="http://schemas.microsoft.com/office/drawing/2014/main" id="{3D930D57-382F-6743-A45A-EAC89A03FB67}"/>
               </a:ext>
             </a:extLst>
           </p:cNvPr>
@@ -3653,6 +3704,19 @@
         <p:txBody>
           <a:bodyPr/>
           <a:lstStyle/>
+          <a:p>
+            <a:r>
+              <a:rPr lang="en-US" dirty="0"/>
+              <a:t>I’m mainly struggling thinking through the code (I think mainly the order of where I’m trying to figure out what)</a:t>
+            </a:r>
+          </a:p>
+          <a:p>
+            <a:pPr lvl="1"/>
+            <a:r>
+              <a:rPr lang="en-US" dirty="0"/>
+              <a:t>We want to show the backboard at different angles for different locations (not all going through the same point). But to plot the backboard angles for different locations, we need to know where the ball hits the backboard. But it hits the backboard at different places for different initial shots (and we’re trying to optimize the backboard angle for all these shots). – show code</a:t>
+            </a:r>
+          </a:p>
           <a:p>
             <a:endParaRPr lang="en-US" dirty="0"/>
           </a:p>
@@ -3661,7 +3725,7 @@
     </p:spTree>
     <p:extLst>
       <p:ext uri="{BB962C8B-B14F-4D97-AF65-F5344CB8AC3E}">
-        <p14:creationId xmlns:p14="http://schemas.microsoft.com/office/powerpoint/2010/main" val="2134100559"/>
+        <p14:creationId xmlns:p14="http://schemas.microsoft.com/office/powerpoint/2010/main" val="2667224272"/>
       </p:ext>
     </p:extLst>
   </p:cSld>
@@ -3693,89 +3757,6 @@
           <p:cNvPr id="2" name="Title 1">
             <a:extLst>
               <a:ext uri="{FF2B5EF4-FFF2-40B4-BE49-F238E27FC236}">
-                <a16:creationId xmlns:a16="http://schemas.microsoft.com/office/drawing/2014/main" id="{E3E92A72-8304-B145-8885-9C3676792BAA}"/>
-              </a:ext>
-            </a:extLst>
-          </p:cNvPr>
-          <p:cNvSpPr>
-            <a:spLocks noGrp="1"/>
-          </p:cNvSpPr>
-          <p:nvPr>
-            <p:ph type="title"/>
-          </p:nvPr>
-        </p:nvSpPr>
-        <p:spPr/>
-        <p:txBody>
-          <a:bodyPr/>
-          <a:lstStyle/>
-          <a:p>
-            <a:r>
-              <a:rPr lang="en-US" dirty="0"/>
-              <a:t>Where am I Stuck</a:t>
-            </a:r>
-          </a:p>
-        </p:txBody>
-      </p:sp>
-      <p:sp>
-        <p:nvSpPr>
-          <p:cNvPr id="3" name="Content Placeholder 2">
-            <a:extLst>
-              <a:ext uri="{FF2B5EF4-FFF2-40B4-BE49-F238E27FC236}">
-                <a16:creationId xmlns:a16="http://schemas.microsoft.com/office/drawing/2014/main" id="{3D930D57-382F-6743-A45A-EAC89A03FB67}"/>
-              </a:ext>
-            </a:extLst>
-          </p:cNvPr>
-          <p:cNvSpPr>
-            <a:spLocks noGrp="1"/>
-          </p:cNvSpPr>
-          <p:nvPr>
-            <p:ph idx="1"/>
-          </p:nvPr>
-        </p:nvSpPr>
-        <p:spPr/>
-        <p:txBody>
-          <a:bodyPr/>
-          <a:lstStyle/>
-          <a:p>
-            <a:endParaRPr lang="en-US"/>
-          </a:p>
-        </p:txBody>
-      </p:sp>
-    </p:spTree>
-    <p:extLst>
-      <p:ext uri="{BB962C8B-B14F-4D97-AF65-F5344CB8AC3E}">
-        <p14:creationId xmlns:p14="http://schemas.microsoft.com/office/powerpoint/2010/main" val="2667224272"/>
-      </p:ext>
-    </p:extLst>
-  </p:cSld>
-  <p:clrMapOvr>
-    <a:masterClrMapping/>
-  </p:clrMapOvr>
-</p:sld>
-</file>
-
-<file path=ppt/slides/slide6.xml><?xml version="1.0" encoding="utf-8"?>
-<p:sld xmlns:a="http://schemas.openxmlformats.org/drawingml/2006/main" xmlns:r="http://schemas.openxmlformats.org/officeDocument/2006/relationships" xmlns:p="http://schemas.openxmlformats.org/presentationml/2006/main">
-  <p:cSld>
-    <p:spTree>
-      <p:nvGrpSpPr>
-        <p:cNvPr id="1" name=""/>
-        <p:cNvGrpSpPr/>
-        <p:nvPr/>
-      </p:nvGrpSpPr>
-      <p:grpSpPr>
-        <a:xfrm>
-          <a:off x="0" y="0"/>
-          <a:ext cx="0" cy="0"/>
-          <a:chOff x="0" y="0"/>
-          <a:chExt cx="0" cy="0"/>
-        </a:xfrm>
-      </p:grpSpPr>
-      <p:sp>
-        <p:nvSpPr>
-          <p:cNvPr id="2" name="Title 1">
-            <a:extLst>
-              <a:ext uri="{FF2B5EF4-FFF2-40B4-BE49-F238E27FC236}">
                 <a16:creationId xmlns:a16="http://schemas.microsoft.com/office/drawing/2014/main" id="{DA5EE71B-6D1D-EA4B-BA31-8CD480CD6166}"/>
               </a:ext>
             </a:extLst>
@@ -3820,7 +3801,10 @@
           <a:bodyPr/>
           <a:lstStyle/>
           <a:p>
-            <a:endParaRPr lang="en-US"/>
+            <a:r>
+              <a:rPr lang="en-US" dirty="0"/>
+              <a:t>Get Monte Carlo code fully working in 2D</a:t>
+            </a:r>
           </a:p>
         </p:txBody>
       </p:sp>
@@ -3837,7 +3821,7 @@
 </p:sld>
 </file>
 
-<file path=ppt/slides/slide7.xml><?xml version="1.0" encoding="utf-8"?>
+<file path=ppt/slides/slide6.xml><?xml version="1.0" encoding="utf-8"?>
 <p:sld xmlns:a="http://schemas.openxmlformats.org/drawingml/2006/main" xmlns:r="http://schemas.openxmlformats.org/officeDocument/2006/relationships" xmlns:p="http://schemas.openxmlformats.org/presentationml/2006/main">
   <p:cSld>
     <p:spTree>

</xml_diff>